<commit_message>
fix creation of acl items
</commit_message>
<xml_diff>
--- a/prez/112 Aplikacja do zarządzania obiegiem dokumentów.pptx
+++ b/prez/112 Aplikacja do zarządzania obiegiem dokumentów.pptx
@@ -4959,6 +4959,10 @@
           <a:bodyPr/>
           <a:lstStyle/>
           <a:p>
+            <a:r>
+              <a:rPr lang="en-US" dirty="0"/>
+              <a:t>Sprawdza się nieźle, gdy od początku wiadomo co </a:t>
+            </a:r>
             <a:endParaRPr lang="en-US"/>
           </a:p>
         </p:txBody>

</xml_diff>